<commit_message>
modified:   summative presentation/Summative Oral Presentation-Group 4.pptx
</commit_message>
<xml_diff>
--- a/summative presentation/Summative Oral Presentation-Group 4.pptx
+++ b/summative presentation/Summative Oral Presentation-Group 4.pptx
@@ -11,10 +11,12 @@
     <p:sldId id="265" r:id="rId5"/>
     <p:sldId id="260" r:id="rId6"/>
     <p:sldId id="262" r:id="rId7"/>
-    <p:sldId id="259" r:id="rId8"/>
-    <p:sldId id="263" r:id="rId9"/>
-    <p:sldId id="261" r:id="rId10"/>
-    <p:sldId id="264" r:id="rId11"/>
+    <p:sldId id="267" r:id="rId8"/>
+    <p:sldId id="259" r:id="rId9"/>
+    <p:sldId id="263" r:id="rId10"/>
+    <p:sldId id="261" r:id="rId11"/>
+    <p:sldId id="269" r:id="rId12"/>
+    <p:sldId id="264" r:id="rId13"/>
   </p:sldIdLst>
   <p:sldSz cx="12192000" cy="6858000"/>
   <p:notesSz cx="6858000" cy="9144000"/>
@@ -121,6 +123,72 @@
 </p:presentation>
 </file>
 
+<file path=ppt/revisionInfo.xml><?xml version="1.0" encoding="utf-8"?>
+<p1510:revInfo xmlns:a="http://schemas.openxmlformats.org/drawingml/2006/main" xmlns:r="http://schemas.openxmlformats.org/officeDocument/2006/relationships" xmlns:p1510="http://schemas.microsoft.com/office/powerpoint/2015/10/main">
+  <p1510:revLst>
+    <p1510:client id="{A52F8CC4-C187-42A6-8D2F-EA89B8D623D8}" v="2" dt="2024-05-07T21:16:55.987"/>
+  </p1510:revLst>
+</p1510:revInfo>
+</file>
+
+<file path=ppt/changesInfos/changesInfo1.xml><?xml version="1.0" encoding="utf-8"?>
+<pc:chgInfo xmlns:a="http://schemas.openxmlformats.org/drawingml/2006/main" xmlns:r="http://schemas.openxmlformats.org/officeDocument/2006/relationships" xmlns:ac="http://schemas.microsoft.com/office/drawing/2013/main/command" xmlns:pc="http://schemas.microsoft.com/office/powerpoint/2013/main/command">
+  <pc:docChgLst>
+    <pc:chgData name="Fangnan Wei" userId="1c1d01cd-2500-49b1-abd0-d9b9393f4555" providerId="ADAL" clId="{A52F8CC4-C187-42A6-8D2F-EA89B8D623D8}"/>
+    <pc:docChg chg="addSld delSld modSld">
+      <pc:chgData name="Fangnan Wei" userId="1c1d01cd-2500-49b1-abd0-d9b9393f4555" providerId="ADAL" clId="{A52F8CC4-C187-42A6-8D2F-EA89B8D623D8}" dt="2024-05-07T21:16:59.504" v="11" actId="2696"/>
+      <pc:docMkLst>
+        <pc:docMk/>
+      </pc:docMkLst>
+      <pc:sldChg chg="modSp new del mod">
+        <pc:chgData name="Fangnan Wei" userId="1c1d01cd-2500-49b1-abd0-d9b9393f4555" providerId="ADAL" clId="{A52F8CC4-C187-42A6-8D2F-EA89B8D623D8}" dt="2024-05-07T21:16:26.541" v="8" actId="2696"/>
+        <pc:sldMkLst>
+          <pc:docMk/>
+          <pc:sldMk cId="795654661" sldId="266"/>
+        </pc:sldMkLst>
+        <pc:spChg chg="mod">
+          <ac:chgData name="Fangnan Wei" userId="1c1d01cd-2500-49b1-abd0-d9b9393f4555" providerId="ADAL" clId="{A52F8CC4-C187-42A6-8D2F-EA89B8D623D8}" dt="2024-05-06T10:45:10.358" v="4" actId="1076"/>
+          <ac:spMkLst>
+            <pc:docMk/>
+            <pc:sldMk cId="795654661" sldId="266"/>
+            <ac:spMk id="2" creationId="{393CC19F-CA02-41DC-60DE-BDD34656347F}"/>
+          </ac:spMkLst>
+        </pc:spChg>
+        <pc:spChg chg="mod">
+          <ac:chgData name="Fangnan Wei" userId="1c1d01cd-2500-49b1-abd0-d9b9393f4555" providerId="ADAL" clId="{A52F8CC4-C187-42A6-8D2F-EA89B8D623D8}" dt="2024-05-06T10:45:20.341" v="6" actId="14100"/>
+          <ac:spMkLst>
+            <pc:docMk/>
+            <pc:sldMk cId="795654661" sldId="266"/>
+            <ac:spMk id="3" creationId="{0352373B-40AE-5247-56DA-56B9AEBC446A}"/>
+          </ac:spMkLst>
+        </pc:spChg>
+      </pc:sldChg>
+      <pc:sldChg chg="add">
+        <pc:chgData name="Fangnan Wei" userId="1c1d01cd-2500-49b1-abd0-d9b9393f4555" providerId="ADAL" clId="{A52F8CC4-C187-42A6-8D2F-EA89B8D623D8}" dt="2024-05-07T21:16:20.579" v="7"/>
+        <pc:sldMkLst>
+          <pc:docMk/>
+          <pc:sldMk cId="3224059382" sldId="267"/>
+        </pc:sldMkLst>
+      </pc:sldChg>
+      <pc:sldChg chg="new del">
+        <pc:chgData name="Fangnan Wei" userId="1c1d01cd-2500-49b1-abd0-d9b9393f4555" providerId="ADAL" clId="{A52F8CC4-C187-42A6-8D2F-EA89B8D623D8}" dt="2024-05-07T21:16:59.504" v="11" actId="2696"/>
+        <pc:sldMkLst>
+          <pc:docMk/>
+          <pc:sldMk cId="3520050958" sldId="268"/>
+        </pc:sldMkLst>
+      </pc:sldChg>
+      <pc:sldChg chg="add">
+        <pc:chgData name="Fangnan Wei" userId="1c1d01cd-2500-49b1-abd0-d9b9393f4555" providerId="ADAL" clId="{A52F8CC4-C187-42A6-8D2F-EA89B8D623D8}" dt="2024-05-07T21:16:55.985" v="10"/>
+        <pc:sldMkLst>
+          <pc:docMk/>
+          <pc:sldMk cId="1500812702" sldId="269"/>
+        </pc:sldMkLst>
+      </pc:sldChg>
+    </pc:docChg>
+  </pc:docChgLst>
+</pc:chgInfo>
+</file>
+
 <file path=ppt/slideLayouts/slideLayout1.xml><?xml version="1.0" encoding="utf-8"?>
 <p:sldLayout xmlns:a="http://schemas.openxmlformats.org/drawingml/2006/main" xmlns:r="http://schemas.openxmlformats.org/officeDocument/2006/relationships" xmlns:p="http://schemas.openxmlformats.org/presentationml/2006/main" showMasterSp="0" type="title" preserve="1">
   <p:cSld name="Title Slide">
@@ -378,7 +446,7 @@
           <a:p>
             <a:fld id="{3341EE12-F28E-4B03-A404-A8FCAE0F6316}" type="datetime1">
               <a:rPr lang="en-US" smtClean="0"/>
-              <a:t>5/4/24</a:t>
+              <a:t>5/7/2024</a:t>
             </a:fld>
             <a:endParaRPr lang="en-US" dirty="0"/>
           </a:p>
@@ -663,7 +731,7 @@
           <a:p>
             <a:fld id="{B68B8189-0D9C-48A6-9FA3-862227B094CE}" type="datetime1">
               <a:rPr lang="en-US" smtClean="0"/>
-              <a:t>5/4/24</a:t>
+              <a:t>5/7/2024</a:t>
             </a:fld>
             <a:endParaRPr lang="en-US"/>
           </a:p>
@@ -1027,7 +1095,7 @@
           <a:p>
             <a:fld id="{26ADDCAE-6443-42C3-9C19-F95985500186}" type="datetime1">
               <a:rPr lang="en-US" smtClean="0"/>
-              <a:t>5/4/24</a:t>
+              <a:t>5/7/2024</a:t>
             </a:fld>
             <a:endParaRPr lang="en-US" dirty="0"/>
           </a:p>
@@ -1289,7 +1357,7 @@
           <a:p>
             <a:fld id="{1962799E-EB8E-4038-8063-81BB57C732D4}" type="datetime1">
               <a:rPr lang="en-US" smtClean="0"/>
-              <a:t>5/4/24</a:t>
+              <a:t>5/7/2024</a:t>
             </a:fld>
             <a:endParaRPr lang="en-US"/>
           </a:p>
@@ -1719,7 +1787,7 @@
           <a:p>
             <a:fld id="{217A73C3-B243-44D3-809D-EF8FDFBD85D4}" type="datetime1">
               <a:rPr lang="en-US" smtClean="0"/>
-              <a:t>5/4/24</a:t>
+              <a:t>5/7/2024</a:t>
             </a:fld>
             <a:endParaRPr lang="en-US" dirty="0"/>
           </a:p>
@@ -2050,7 +2118,7 @@
           <a:p>
             <a:fld id="{C9B6D3E3-28E2-4380-A113-67698215C5F8}" type="datetime1">
               <a:rPr lang="en-US" smtClean="0"/>
-              <a:t>5/4/24</a:t>
+              <a:t>5/7/2024</a:t>
             </a:fld>
             <a:endParaRPr lang="en-US" dirty="0"/>
           </a:p>
@@ -2483,7 +2551,7 @@
           <a:p>
             <a:fld id="{A9EFCB61-04AD-47C9-BF79-2BD8B9CEC07A}" type="datetime1">
               <a:rPr lang="en-US" smtClean="0"/>
-              <a:t>5/4/24</a:t>
+              <a:t>5/7/2024</a:t>
             </a:fld>
             <a:endParaRPr lang="en-US" dirty="0"/>
           </a:p>
@@ -2635,7 +2703,7 @@
           <a:p>
             <a:fld id="{A4535E0C-D585-492F-8146-7493F4086301}" type="datetime1">
               <a:rPr lang="en-US" smtClean="0"/>
-              <a:t>5/4/24</a:t>
+              <a:t>5/7/2024</a:t>
             </a:fld>
             <a:endParaRPr lang="en-US"/>
           </a:p>
@@ -2798,7 +2866,7 @@
           <a:p>
             <a:fld id="{8CE48390-48B5-49AB-B019-A7C8FB8C31F6}" type="datetime1">
               <a:rPr lang="en-US" smtClean="0"/>
-              <a:t>5/4/24</a:t>
+              <a:t>5/7/2024</a:t>
             </a:fld>
             <a:endParaRPr lang="en-US"/>
           </a:p>
@@ -3327,7 +3395,7 @@
           <a:p>
             <a:fld id="{962E767E-8A14-4E70-91B9-2101CBC4D7BD}" type="datetime1">
               <a:rPr lang="en-US" smtClean="0"/>
-              <a:t>5/4/24</a:t>
+              <a:t>5/7/2024</a:t>
             </a:fld>
             <a:endParaRPr lang="en-US" dirty="0"/>
           </a:p>
@@ -3848,7 +3916,7 @@
           <a:p>
             <a:fld id="{01AF0C4B-5A4A-45CA-ABEC-10F107160D33}" type="datetime1">
               <a:rPr lang="en-US" smtClean="0"/>
-              <a:t>5/4/24</a:t>
+              <a:t>5/7/2024</a:t>
             </a:fld>
             <a:endParaRPr lang="en-US" dirty="0"/>
           </a:p>
@@ -4398,7 +4466,7 @@
           <a:p>
             <a:fld id="{6989806E-8E94-473C-AEE7-BE6F15F85533}" type="datetime1">
               <a:rPr lang="en-US" smtClean="0"/>
-              <a:t>5/4/24</a:t>
+              <a:t>5/7/2024</a:t>
             </a:fld>
             <a:endParaRPr lang="en-US" dirty="0"/>
           </a:p>
@@ -5430,6 +5498,441 @@
           <p:cNvPr id="2" name="Title 1">
             <a:extLst>
               <a:ext uri="{FF2B5EF4-FFF2-40B4-BE49-F238E27FC236}">
+                <a16:creationId xmlns:a16="http://schemas.microsoft.com/office/drawing/2014/main" id="{A5EBCF6C-F3B7-D40C-4116-938723043DC0}"/>
+              </a:ext>
+            </a:extLst>
+          </p:cNvPr>
+          <p:cNvSpPr>
+            <a:spLocks noGrp="1"/>
+          </p:cNvSpPr>
+          <p:nvPr>
+            <p:ph type="title"/>
+          </p:nvPr>
+        </p:nvSpPr>
+        <p:spPr/>
+        <p:txBody>
+          <a:bodyPr>
+            <a:normAutofit fontScale="90000"/>
+          </a:bodyPr>
+          <a:lstStyle/>
+          <a:p>
+            <a:r>
+              <a:rPr lang="en-US" dirty="0"/>
+              <a:t>1 SLIDE ANALYSIS ON CLUSTERING RESULTS</a:t>
+            </a:r>
+          </a:p>
+        </p:txBody>
+      </p:sp>
+      <p:sp>
+        <p:nvSpPr>
+          <p:cNvPr id="3" name="Content Placeholder 2">
+            <a:extLst>
+              <a:ext uri="{FF2B5EF4-FFF2-40B4-BE49-F238E27FC236}">
+                <a16:creationId xmlns:a16="http://schemas.microsoft.com/office/drawing/2014/main" id="{502B6705-E1B7-84F3-6D9A-BA8C0DB780B8}"/>
+              </a:ext>
+            </a:extLst>
+          </p:cNvPr>
+          <p:cNvSpPr>
+            <a:spLocks noGrp="1"/>
+          </p:cNvSpPr>
+          <p:nvPr>
+            <p:ph idx="1"/>
+          </p:nvPr>
+        </p:nvSpPr>
+        <p:spPr/>
+        <p:txBody>
+          <a:bodyPr/>
+          <a:lstStyle/>
+          <a:p>
+            <a:r>
+              <a:rPr lang="en-US" dirty="0"/>
+              <a:t>CLUSTERING RESULTS (AGGLOMERATIVE)TO BE ADDED HERE AND EXPLAINED BY FANGNAN</a:t>
+            </a:r>
+          </a:p>
+        </p:txBody>
+      </p:sp>
+    </p:spTree>
+    <p:extLst>
+      <p:ext uri="{BB962C8B-B14F-4D97-AF65-F5344CB8AC3E}">
+        <p14:creationId xmlns:p14="http://schemas.microsoft.com/office/powerpoint/2010/main" val="722228977"/>
+      </p:ext>
+    </p:extLst>
+  </p:cSld>
+  <p:clrMapOvr>
+    <a:masterClrMapping/>
+  </p:clrMapOvr>
+</p:sld>
+</file>
+
+<file path=ppt/slides/slide11.xml><?xml version="1.0" encoding="utf-8"?>
+<p:sld xmlns:a="http://schemas.openxmlformats.org/drawingml/2006/main" xmlns:r="http://schemas.openxmlformats.org/officeDocument/2006/relationships" xmlns:p="http://schemas.openxmlformats.org/presentationml/2006/main">
+  <p:cSld>
+    <p:spTree>
+      <p:nvGrpSpPr>
+        <p:cNvPr id="1" name=""/>
+        <p:cNvGrpSpPr/>
+        <p:nvPr/>
+      </p:nvGrpSpPr>
+      <p:grpSpPr>
+        <a:xfrm>
+          <a:off x="0" y="0"/>
+          <a:ext cx="0" cy="0"/>
+          <a:chOff x="0" y="0"/>
+          <a:chExt cx="0" cy="0"/>
+        </a:xfrm>
+      </p:grpSpPr>
+      <p:sp>
+        <p:nvSpPr>
+          <p:cNvPr id="2" name="标题 1">
+            <a:extLst>
+              <a:ext uri="{FF2B5EF4-FFF2-40B4-BE49-F238E27FC236}">
+                <a16:creationId xmlns:a16="http://schemas.microsoft.com/office/drawing/2014/main" id="{61479695-F3B8-4212-F024-62833181F511}"/>
+              </a:ext>
+            </a:extLst>
+          </p:cNvPr>
+          <p:cNvSpPr>
+            <a:spLocks noGrp="1"/>
+          </p:cNvSpPr>
+          <p:nvPr>
+            <p:ph type="title"/>
+          </p:nvPr>
+        </p:nvSpPr>
+        <p:spPr>
+          <a:xfrm>
+            <a:off x="806875" y="73720"/>
+            <a:ext cx="6362013" cy="650841"/>
+          </a:xfrm>
+        </p:spPr>
+        <p:txBody>
+          <a:bodyPr>
+            <a:normAutofit/>
+          </a:bodyPr>
+          <a:lstStyle/>
+          <a:p>
+            <a:r>
+              <a:rPr lang="en-US" altLang="zh-CN" sz="2000" dirty="0"/>
+              <a:t>ANALYSIS ON CLUSTERING RESULTS</a:t>
+            </a:r>
+            <a:endParaRPr lang="zh-CN" altLang="en-US" sz="2000" dirty="0"/>
+          </a:p>
+        </p:txBody>
+      </p:sp>
+      <p:pic>
+        <p:nvPicPr>
+          <p:cNvPr id="17" name="内容占位符 16" descr="图表, 折线图&#10;&#10;描述已自动生成">
+            <a:extLst>
+              <a:ext uri="{FF2B5EF4-FFF2-40B4-BE49-F238E27FC236}">
+                <a16:creationId xmlns:a16="http://schemas.microsoft.com/office/drawing/2014/main" id="{0F2EA432-3261-A558-F2AE-2DC2145B1597}"/>
+              </a:ext>
+            </a:extLst>
+          </p:cNvPr>
+          <p:cNvPicPr>
+            <a:picLocks noGrp="1" noChangeAspect="1"/>
+          </p:cNvPicPr>
+          <p:nvPr>
+            <p:ph idx="1"/>
+          </p:nvPr>
+        </p:nvPicPr>
+        <p:blipFill>
+          <a:blip r:embed="rId2"/>
+          <a:stretch>
+            <a:fillRect/>
+          </a:stretch>
+        </p:blipFill>
+        <p:spPr>
+          <a:xfrm>
+            <a:off x="637292" y="885552"/>
+            <a:ext cx="2665889" cy="1717388"/>
+          </a:xfrm>
+        </p:spPr>
+      </p:pic>
+      <p:pic>
+        <p:nvPicPr>
+          <p:cNvPr id="19" name="图片 18" descr="图表, 折线图&#10;&#10;描述已自动生成">
+            <a:extLst>
+              <a:ext uri="{FF2B5EF4-FFF2-40B4-BE49-F238E27FC236}">
+                <a16:creationId xmlns:a16="http://schemas.microsoft.com/office/drawing/2014/main" id="{769996E1-AA65-3757-3B40-1BBBE93EB3FC}"/>
+              </a:ext>
+            </a:extLst>
+          </p:cNvPr>
+          <p:cNvPicPr>
+            <a:picLocks noChangeAspect="1"/>
+          </p:cNvPicPr>
+          <p:nvPr/>
+        </p:nvPicPr>
+        <p:blipFill>
+          <a:blip r:embed="rId3"/>
+          <a:stretch>
+            <a:fillRect/>
+          </a:stretch>
+        </p:blipFill>
+        <p:spPr>
+          <a:xfrm>
+            <a:off x="3688965" y="885548"/>
+            <a:ext cx="2665889" cy="1717387"/>
+          </a:xfrm>
+          <a:prstGeom prst="rect">
+            <a:avLst/>
+          </a:prstGeom>
+        </p:spPr>
+      </p:pic>
+      <p:pic>
+        <p:nvPicPr>
+          <p:cNvPr id="21" name="图片 20" descr="图表, 折线图&#10;&#10;描述已自动生成">
+            <a:extLst>
+              <a:ext uri="{FF2B5EF4-FFF2-40B4-BE49-F238E27FC236}">
+                <a16:creationId xmlns:a16="http://schemas.microsoft.com/office/drawing/2014/main" id="{E7485E84-8291-D12B-27A4-879963369A76}"/>
+              </a:ext>
+            </a:extLst>
+          </p:cNvPr>
+          <p:cNvPicPr>
+            <a:picLocks noChangeAspect="1"/>
+          </p:cNvPicPr>
+          <p:nvPr/>
+        </p:nvPicPr>
+        <p:blipFill>
+          <a:blip r:embed="rId4"/>
+          <a:stretch>
+            <a:fillRect/>
+          </a:stretch>
+        </p:blipFill>
+        <p:spPr>
+          <a:xfrm>
+            <a:off x="6740638" y="885547"/>
+            <a:ext cx="2665889" cy="1717387"/>
+          </a:xfrm>
+          <a:prstGeom prst="rect">
+            <a:avLst/>
+          </a:prstGeom>
+        </p:spPr>
+      </p:pic>
+      <p:pic>
+        <p:nvPicPr>
+          <p:cNvPr id="23" name="图片 22" descr="图表, 折线图&#10;&#10;描述已自动生成">
+            <a:extLst>
+              <a:ext uri="{FF2B5EF4-FFF2-40B4-BE49-F238E27FC236}">
+                <a16:creationId xmlns:a16="http://schemas.microsoft.com/office/drawing/2014/main" id="{2293A320-7991-0C0A-2BB7-BEBCA7E353ED}"/>
+              </a:ext>
+            </a:extLst>
+          </p:cNvPr>
+          <p:cNvPicPr>
+            <a:picLocks noChangeAspect="1"/>
+          </p:cNvPicPr>
+          <p:nvPr/>
+        </p:nvPicPr>
+        <p:blipFill>
+          <a:blip r:embed="rId5"/>
+          <a:stretch>
+            <a:fillRect/>
+          </a:stretch>
+        </p:blipFill>
+        <p:spPr>
+          <a:xfrm>
+            <a:off x="625539" y="2602935"/>
+            <a:ext cx="2665889" cy="1717388"/>
+          </a:xfrm>
+          <a:prstGeom prst="rect">
+            <a:avLst/>
+          </a:prstGeom>
+        </p:spPr>
+      </p:pic>
+      <p:pic>
+        <p:nvPicPr>
+          <p:cNvPr id="25" name="图片 24" descr="图表, 折线图&#10;&#10;描述已自动生成">
+            <a:extLst>
+              <a:ext uri="{FF2B5EF4-FFF2-40B4-BE49-F238E27FC236}">
+                <a16:creationId xmlns:a16="http://schemas.microsoft.com/office/drawing/2014/main" id="{DE5D75D5-4D7D-EE13-635A-C9929E280870}"/>
+              </a:ext>
+            </a:extLst>
+          </p:cNvPr>
+          <p:cNvPicPr>
+            <a:picLocks noChangeAspect="1"/>
+          </p:cNvPicPr>
+          <p:nvPr/>
+        </p:nvPicPr>
+        <p:blipFill>
+          <a:blip r:embed="rId6"/>
+          <a:stretch>
+            <a:fillRect/>
+          </a:stretch>
+        </p:blipFill>
+        <p:spPr>
+          <a:xfrm>
+            <a:off x="3684971" y="2602934"/>
+            <a:ext cx="2665889" cy="1717387"/>
+          </a:xfrm>
+          <a:prstGeom prst="rect">
+            <a:avLst/>
+          </a:prstGeom>
+        </p:spPr>
+      </p:pic>
+      <p:pic>
+        <p:nvPicPr>
+          <p:cNvPr id="27" name="图片 26" descr="图表, 折线图&#10;&#10;描述已自动生成">
+            <a:extLst>
+              <a:ext uri="{FF2B5EF4-FFF2-40B4-BE49-F238E27FC236}">
+                <a16:creationId xmlns:a16="http://schemas.microsoft.com/office/drawing/2014/main" id="{6BE9918B-8FAB-DA9B-FDD8-4EDE07CC47A8}"/>
+              </a:ext>
+            </a:extLst>
+          </p:cNvPr>
+          <p:cNvPicPr>
+            <a:picLocks noChangeAspect="1"/>
+          </p:cNvPicPr>
+          <p:nvPr/>
+        </p:nvPicPr>
+        <p:blipFill>
+          <a:blip r:embed="rId7"/>
+          <a:stretch>
+            <a:fillRect/>
+          </a:stretch>
+        </p:blipFill>
+        <p:spPr>
+          <a:xfrm>
+            <a:off x="6728885" y="2602933"/>
+            <a:ext cx="2665888" cy="1717387"/>
+          </a:xfrm>
+          <a:prstGeom prst="rect">
+            <a:avLst/>
+          </a:prstGeom>
+        </p:spPr>
+      </p:pic>
+      <p:sp>
+        <p:nvSpPr>
+          <p:cNvPr id="29" name="文本框 28">
+            <a:extLst>
+              <a:ext uri="{FF2B5EF4-FFF2-40B4-BE49-F238E27FC236}">
+                <a16:creationId xmlns:a16="http://schemas.microsoft.com/office/drawing/2014/main" id="{5628B892-0D5D-A548-D2D4-430BEDA79223}"/>
+              </a:ext>
+            </a:extLst>
+          </p:cNvPr>
+          <p:cNvSpPr txBox="1"/>
+          <p:nvPr/>
+        </p:nvSpPr>
+        <p:spPr>
+          <a:xfrm>
+            <a:off x="625539" y="4430333"/>
+            <a:ext cx="10881734" cy="2339102"/>
+          </a:xfrm>
+          <a:prstGeom prst="rect">
+            <a:avLst/>
+          </a:prstGeom>
+          <a:noFill/>
+        </p:spPr>
+        <p:txBody>
+          <a:bodyPr wrap="square" rtlCol="0">
+            <a:spAutoFit/>
+          </a:bodyPr>
+          <a:lstStyle/>
+          <a:p>
+            <a:r>
+              <a:rPr lang="en-US" altLang="zh-CN" sz="1600" dirty="0" err="1">
+                <a:latin typeface="Times New Roman" panose="02020603050405020304" pitchFamily="18" charset="0"/>
+                <a:cs typeface="Times New Roman" panose="02020603050405020304" pitchFamily="18" charset="0"/>
+              </a:rPr>
+              <a:t>calculate_purity</a:t>
+            </a:r>
+            <a:r>
+              <a:rPr lang="en-US" altLang="zh-CN" sz="1600" dirty="0">
+                <a:latin typeface="Times New Roman" panose="02020603050405020304" pitchFamily="18" charset="0"/>
+                <a:cs typeface="Times New Roman" panose="02020603050405020304" pitchFamily="18" charset="0"/>
+              </a:rPr>
+              <a:t>: Determine the purity of each cluster by calculating the proportion of the most common target labels in each cluster.</a:t>
+            </a:r>
+          </a:p>
+          <a:p>
+            <a:r>
+              <a:rPr lang="en-US" altLang="zh-CN" sz="1600" dirty="0" err="1">
+                <a:latin typeface="Times New Roman" panose="02020603050405020304" pitchFamily="18" charset="0"/>
+                <a:cs typeface="Times New Roman" panose="02020603050405020304" pitchFamily="18" charset="0"/>
+              </a:rPr>
+              <a:t>pure_clusters_fraction</a:t>
+            </a:r>
+            <a:r>
+              <a:rPr lang="en-US" altLang="zh-CN" sz="1600" dirty="0">
+                <a:latin typeface="Times New Roman" panose="02020603050405020304" pitchFamily="18" charset="0"/>
+                <a:cs typeface="Times New Roman" panose="02020603050405020304" pitchFamily="18" charset="0"/>
+              </a:rPr>
+              <a:t>: Calculate the proportion of clusters with perfect purity (purity of 1).</a:t>
+            </a:r>
+          </a:p>
+          <a:p>
+            <a:r>
+              <a:rPr lang="en-US" altLang="zh-CN" sz="1600" dirty="0" err="1">
+                <a:latin typeface="Times New Roman" panose="02020603050405020304" pitchFamily="18" charset="0"/>
+                <a:cs typeface="Times New Roman" panose="02020603050405020304" pitchFamily="18" charset="0"/>
+              </a:rPr>
+              <a:t>pure_cluster_retention</a:t>
+            </a:r>
+            <a:r>
+              <a:rPr lang="en-US" altLang="zh-CN" sz="1600" dirty="0">
+                <a:latin typeface="Times New Roman" panose="02020603050405020304" pitchFamily="18" charset="0"/>
+                <a:cs typeface="Times New Roman" panose="02020603050405020304" pitchFamily="18" charset="0"/>
+              </a:rPr>
+              <a:t>: Evaluates the proportion of samples in all data that belong to completely pure clusters.</a:t>
+            </a:r>
+            <a:endParaRPr lang="zh-CN" altLang="en-US" sz="1600" b="0" i="0" dirty="0">
+              <a:solidFill>
+                <a:srgbClr val="0D0D0D"/>
+              </a:solidFill>
+              <a:effectLst/>
+              <a:latin typeface="Times New Roman" panose="02020603050405020304" pitchFamily="18" charset="0"/>
+              <a:cs typeface="Times New Roman" panose="02020603050405020304" pitchFamily="18" charset="0"/>
+            </a:endParaRPr>
+          </a:p>
+          <a:p>
+            <a:r>
+              <a:rPr lang="en-US" altLang="zh-CN" sz="1600" b="0" i="0" dirty="0">
+                <a:solidFill>
+                  <a:srgbClr val="0D0D0D"/>
+                </a:solidFill>
+                <a:effectLst/>
+                <a:latin typeface="Times New Roman" panose="02020603050405020304" pitchFamily="18" charset="0"/>
+                <a:cs typeface="Times New Roman" panose="02020603050405020304" pitchFamily="18" charset="0"/>
+              </a:rPr>
+              <a:t>These six figures show the impact of cluster number on Purity Fraction, Purity Retention and NMI. It can be observed that as the number of clusters increases, Purity Fraction and NMI generally show an upward trend, indicating that the refinement of clustering helps to improve the consistency of clustering and the increase of NMI. Purity Retention increases slowly in some cases because although the number of high-purity clusters increases, the proportion of samples belonging to these clusters in the overall data does not necessarily increase significantly.</a:t>
+            </a:r>
+            <a:endParaRPr lang="zh-CN" altLang="en-US" sz="1600" dirty="0">
+              <a:latin typeface="Times New Roman" panose="02020603050405020304" pitchFamily="18" charset="0"/>
+              <a:cs typeface="Times New Roman" panose="02020603050405020304" pitchFamily="18" charset="0"/>
+            </a:endParaRPr>
+          </a:p>
+        </p:txBody>
+      </p:sp>
+    </p:spTree>
+    <p:extLst>
+      <p:ext uri="{BB962C8B-B14F-4D97-AF65-F5344CB8AC3E}">
+        <p14:creationId xmlns:p14="http://schemas.microsoft.com/office/powerpoint/2010/main" val="1500812702"/>
+      </p:ext>
+    </p:extLst>
+  </p:cSld>
+  <p:clrMapOvr>
+    <a:masterClrMapping/>
+  </p:clrMapOvr>
+</p:sld>
+</file>
+
+<file path=ppt/slides/slide12.xml><?xml version="1.0" encoding="utf-8"?>
+<p:sld xmlns:a="http://schemas.openxmlformats.org/drawingml/2006/main" xmlns:r="http://schemas.openxmlformats.org/officeDocument/2006/relationships" xmlns:p="http://schemas.openxmlformats.org/presentationml/2006/main">
+  <p:cSld>
+    <p:spTree>
+      <p:nvGrpSpPr>
+        <p:cNvPr id="1" name=""/>
+        <p:cNvGrpSpPr/>
+        <p:nvPr/>
+      </p:nvGrpSpPr>
+      <p:grpSpPr>
+        <a:xfrm>
+          <a:off x="0" y="0"/>
+          <a:ext cx="0" cy="0"/>
+          <a:chOff x="0" y="0"/>
+          <a:chExt cx="0" cy="0"/>
+        </a:xfrm>
+      </p:grpSpPr>
+      <p:sp>
+        <p:nvSpPr>
+          <p:cNvPr id="2" name="Title 1">
+            <a:extLst>
+              <a:ext uri="{FF2B5EF4-FFF2-40B4-BE49-F238E27FC236}">
                 <a16:creationId xmlns:a16="http://schemas.microsoft.com/office/drawing/2014/main" id="{D8A2CCAF-115E-5664-3704-23FB5C19A9A5}"/>
               </a:ext>
             </a:extLst>
@@ -5952,10 +6455,10 @@
       </p:grpSpPr>
       <p:sp>
         <p:nvSpPr>
-          <p:cNvPr id="2" name="Title 1">
-            <a:extLst>
-              <a:ext uri="{FF2B5EF4-FFF2-40B4-BE49-F238E27FC236}">
-                <a16:creationId xmlns:a16="http://schemas.microsoft.com/office/drawing/2014/main" id="{8FF5C523-683A-0BB4-7A9C-CFE3D1DC2C5B}"/>
+          <p:cNvPr id="2" name="标题 1">
+            <a:extLst>
+              <a:ext uri="{FF2B5EF4-FFF2-40B4-BE49-F238E27FC236}">
+                <a16:creationId xmlns:a16="http://schemas.microsoft.com/office/drawing/2014/main" id="{393CC19F-CA02-41DC-60DE-BDD34656347F}"/>
               </a:ext>
             </a:extLst>
           </p:cNvPr>
@@ -5966,26 +6469,32 @@
             <p:ph type="title"/>
           </p:nvPr>
         </p:nvSpPr>
-        <p:spPr/>
+        <p:spPr>
+          <a:xfrm>
+            <a:off x="761799" y="263560"/>
+            <a:ext cx="5390906" cy="934376"/>
+          </a:xfrm>
+        </p:spPr>
         <p:txBody>
           <a:bodyPr>
-            <a:normAutofit fontScale="90000"/>
+            <a:normAutofit/>
           </a:bodyPr>
           <a:lstStyle/>
           <a:p>
             <a:r>
-              <a:rPr lang="en-US" dirty="0"/>
-              <a:t>ANALYSIS ON DIMENSIONALITY REDUCTION OUTCOMES USE ABOUT 1-2 SLIDES</a:t>
-            </a:r>
-          </a:p>
-        </p:txBody>
-      </p:sp>
-      <p:sp>
-        <p:nvSpPr>
-          <p:cNvPr id="3" name="Content Placeholder 2">
-            <a:extLst>
-              <a:ext uri="{FF2B5EF4-FFF2-40B4-BE49-F238E27FC236}">
-                <a16:creationId xmlns:a16="http://schemas.microsoft.com/office/drawing/2014/main" id="{8912B0F5-80EF-6C0A-8582-2BDBEB8C57A6}"/>
+              <a:rPr lang="en-US" altLang="zh-CN" sz="2000" dirty="0"/>
+              <a:t>LEVENSHTEIN DISTANCE CALCULATION</a:t>
+            </a:r>
+            <a:endParaRPr lang="zh-CN" altLang="en-US" sz="2000" dirty="0"/>
+          </a:p>
+        </p:txBody>
+      </p:sp>
+      <p:sp>
+        <p:nvSpPr>
+          <p:cNvPr id="3" name="内容占位符 2">
+            <a:extLst>
+              <a:ext uri="{FF2B5EF4-FFF2-40B4-BE49-F238E27FC236}">
+                <a16:creationId xmlns:a16="http://schemas.microsoft.com/office/drawing/2014/main" id="{0352373B-40AE-5247-56DA-56B9AEBC446A}"/>
               </a:ext>
             </a:extLst>
           </p:cNvPr>
@@ -5996,25 +6505,380 @@
             <p:ph idx="1"/>
           </p:nvPr>
         </p:nvSpPr>
-        <p:spPr/>
-        <p:txBody>
-          <a:bodyPr/>
-          <a:lstStyle/>
-          <a:p>
-            <a:r>
-              <a:rPr lang="en-US" dirty="0"/>
-              <a:t>TO BE ADDED BY JIADONG AND TO BE EXPLAINED BY HIM IN THE PRESENTATION</a:t>
-            </a:r>
-          </a:p>
-          <a:p>
-            <a:endParaRPr lang="en-US" dirty="0"/>
+        <p:spPr>
+          <a:xfrm>
+            <a:off x="761799" y="1105786"/>
+            <a:ext cx="10381205" cy="5488653"/>
+          </a:xfrm>
+        </p:spPr>
+        <p:txBody>
+          <a:bodyPr>
+            <a:normAutofit fontScale="62500" lnSpcReduction="20000"/>
+          </a:bodyPr>
+          <a:lstStyle/>
+          <a:p>
+            <a:r>
+              <a:rPr lang="en-US" altLang="zh-CN" dirty="0">
+                <a:latin typeface="Times New Roman" panose="02020603050405020304" pitchFamily="18" charset="0"/>
+                <a:cs typeface="Times New Roman" panose="02020603050405020304" pitchFamily="18" charset="0"/>
+              </a:rPr>
+              <a:t>P</a:t>
+            </a:r>
+            <a:r>
+              <a:rPr lang="en-GB" altLang="zh-CN" dirty="0" err="1">
+                <a:latin typeface="Times New Roman" panose="02020603050405020304" pitchFamily="18" charset="0"/>
+                <a:cs typeface="Times New Roman" panose="02020603050405020304" pitchFamily="18" charset="0"/>
+              </a:rPr>
+              <a:t>rinciple</a:t>
+            </a:r>
+            <a:r>
+              <a:rPr lang="zh-CN" altLang="en-US" dirty="0">
+                <a:latin typeface="Times New Roman" panose="02020603050405020304" pitchFamily="18" charset="0"/>
+                <a:cs typeface="Times New Roman" panose="02020603050405020304" pitchFamily="18" charset="0"/>
+              </a:rPr>
+              <a:t>：</a:t>
+            </a:r>
+            <a:endParaRPr lang="en-US" altLang="zh-CN" dirty="0">
+              <a:latin typeface="Times New Roman" panose="02020603050405020304" pitchFamily="18" charset="0"/>
+              <a:cs typeface="Times New Roman" panose="02020603050405020304" pitchFamily="18" charset="0"/>
+            </a:endParaRPr>
+          </a:p>
+          <a:p>
+            <a:pPr>
+              <a:lnSpc>
+                <a:spcPct val="120000"/>
+              </a:lnSpc>
+            </a:pPr>
+            <a:r>
+              <a:rPr lang="en-US" altLang="zh-CN" dirty="0">
+                <a:latin typeface="Times New Roman" panose="02020603050405020304" pitchFamily="18" charset="0"/>
+                <a:cs typeface="Times New Roman" panose="02020603050405020304" pitchFamily="18" charset="0"/>
+              </a:rPr>
+              <a:t>The minimum number of single-character edits (insertions, deletions, or substitutions) required to convert one string into another.</a:t>
+            </a:r>
+          </a:p>
+          <a:p>
+            <a:pPr>
+              <a:lnSpc>
+                <a:spcPct val="120000"/>
+              </a:lnSpc>
+            </a:pPr>
+            <a:r>
+              <a:rPr lang="en-US" altLang="zh-CN" dirty="0">
+                <a:latin typeface="Times New Roman" panose="02020603050405020304" pitchFamily="18" charset="0"/>
+                <a:cs typeface="Times New Roman" panose="02020603050405020304" pitchFamily="18" charset="0"/>
+              </a:rPr>
+              <a:t>Create a matrix of size </a:t>
+            </a:r>
+            <a:r>
+              <a:rPr lang="en-US" altLang="zh-CN" b="1" i="1" dirty="0">
+                <a:latin typeface="Times New Roman" panose="02020603050405020304" pitchFamily="18" charset="0"/>
+                <a:cs typeface="Times New Roman" panose="02020603050405020304" pitchFamily="18" charset="0"/>
+              </a:rPr>
+              <a:t>(m+1) x (n+1)</a:t>
+            </a:r>
+            <a:r>
+              <a:rPr lang="en-US" altLang="zh-CN" dirty="0">
+                <a:latin typeface="Times New Roman" panose="02020603050405020304" pitchFamily="18" charset="0"/>
+                <a:cs typeface="Times New Roman" panose="02020603050405020304" pitchFamily="18" charset="0"/>
+              </a:rPr>
+              <a:t>, where m and n are the lengths of the two strings.</a:t>
+            </a:r>
+          </a:p>
+          <a:p>
+            <a:pPr>
+              <a:lnSpc>
+                <a:spcPct val="120000"/>
+              </a:lnSpc>
+            </a:pPr>
+            <a:r>
+              <a:rPr lang="en-US" altLang="zh-CN" dirty="0">
+                <a:latin typeface="Times New Roman" panose="02020603050405020304" pitchFamily="18" charset="0"/>
+                <a:cs typeface="Times New Roman" panose="02020603050405020304" pitchFamily="18" charset="0"/>
+              </a:rPr>
+              <a:t>If the two current characters are the same (i.e. the </a:t>
+            </a:r>
+            <a:r>
+              <a:rPr lang="en-US" altLang="zh-CN" dirty="0" err="1">
+                <a:latin typeface="Times New Roman" panose="02020603050405020304" pitchFamily="18" charset="0"/>
+                <a:cs typeface="Times New Roman" panose="02020603050405020304" pitchFamily="18" charset="0"/>
+              </a:rPr>
+              <a:t>i-th</a:t>
+            </a:r>
+            <a:r>
+              <a:rPr lang="en-US" altLang="zh-CN" dirty="0">
+                <a:latin typeface="Times New Roman" panose="02020603050405020304" pitchFamily="18" charset="0"/>
+                <a:cs typeface="Times New Roman" panose="02020603050405020304" pitchFamily="18" charset="0"/>
+              </a:rPr>
+              <a:t> character of the first string and the j-</a:t>
+            </a:r>
+            <a:r>
+              <a:rPr lang="en-US" altLang="zh-CN" dirty="0" err="1">
+                <a:latin typeface="Times New Roman" panose="02020603050405020304" pitchFamily="18" charset="0"/>
+                <a:cs typeface="Times New Roman" panose="02020603050405020304" pitchFamily="18" charset="0"/>
+              </a:rPr>
+              <a:t>th</a:t>
+            </a:r>
+            <a:r>
+              <a:rPr lang="en-US" altLang="zh-CN" dirty="0">
+                <a:latin typeface="Times New Roman" panose="02020603050405020304" pitchFamily="18" charset="0"/>
+                <a:cs typeface="Times New Roman" panose="02020603050405020304" pitchFamily="18" charset="0"/>
+              </a:rPr>
+              <a:t> character of the second string), then </a:t>
+            </a:r>
+            <a:r>
+              <a:rPr lang="pl-PL" altLang="zh-CN" b="1" i="1" dirty="0">
+                <a:latin typeface="Times New Roman" panose="02020603050405020304" pitchFamily="18" charset="0"/>
+                <a:cs typeface="Times New Roman" panose="02020603050405020304" pitchFamily="18" charset="0"/>
+              </a:rPr>
+              <a:t>d[i][j]=d[i−1][j−1] </a:t>
+            </a:r>
+            <a:r>
+              <a:rPr lang="en-US" altLang="zh-CN" dirty="0">
+                <a:latin typeface="Times New Roman" panose="02020603050405020304" pitchFamily="18" charset="0"/>
+                <a:cs typeface="Times New Roman" panose="02020603050405020304" pitchFamily="18" charset="0"/>
+              </a:rPr>
+              <a:t>(no additional editing is required).</a:t>
+            </a:r>
+          </a:p>
+          <a:p>
+            <a:pPr>
+              <a:lnSpc>
+                <a:spcPct val="120000"/>
+              </a:lnSpc>
+            </a:pPr>
+            <a:r>
+              <a:rPr lang="en-US" altLang="zh-CN" dirty="0">
+                <a:latin typeface="Times New Roman" panose="02020603050405020304" pitchFamily="18" charset="0"/>
+                <a:cs typeface="Times New Roman" panose="02020603050405020304" pitchFamily="18" charset="0"/>
+              </a:rPr>
+              <a:t>If different, choose the smallest edit distance among the three operations:</a:t>
+            </a:r>
+          </a:p>
+          <a:p>
+            <a:pPr>
+              <a:lnSpc>
+                <a:spcPct val="120000"/>
+              </a:lnSpc>
+            </a:pPr>
+            <a:r>
+              <a:rPr lang="en-US" altLang="zh-CN" dirty="0">
+                <a:latin typeface="Times New Roman" panose="02020603050405020304" pitchFamily="18" charset="0"/>
+                <a:cs typeface="Times New Roman" panose="02020603050405020304" pitchFamily="18" charset="0"/>
+              </a:rPr>
+              <a:t>Delete</a:t>
+            </a:r>
+            <a:r>
+              <a:rPr lang="en-US" altLang="zh-CN" b="1" i="1" dirty="0">
+                <a:latin typeface="Times New Roman" panose="02020603050405020304" pitchFamily="18" charset="0"/>
+                <a:cs typeface="Times New Roman" panose="02020603050405020304" pitchFamily="18" charset="0"/>
+              </a:rPr>
+              <a:t>: </a:t>
+            </a:r>
+            <a:r>
+              <a:rPr lang="zh-CN" altLang="en-US" b="1" i="1" dirty="0">
+                <a:latin typeface="Times New Roman" panose="02020603050405020304" pitchFamily="18" charset="0"/>
+                <a:cs typeface="Times New Roman" panose="02020603050405020304" pitchFamily="18" charset="0"/>
+              </a:rPr>
+              <a:t>𝑑 </a:t>
+            </a:r>
+            <a:r>
+              <a:rPr lang="en-US" altLang="zh-CN" b="1" i="1" dirty="0">
+                <a:latin typeface="Times New Roman" panose="02020603050405020304" pitchFamily="18" charset="0"/>
+                <a:cs typeface="Times New Roman" panose="02020603050405020304" pitchFamily="18" charset="0"/>
+              </a:rPr>
+              <a:t>[i−1][j]+1</a:t>
+            </a:r>
+          </a:p>
+          <a:p>
+            <a:pPr>
+              <a:lnSpc>
+                <a:spcPct val="120000"/>
+              </a:lnSpc>
+            </a:pPr>
+            <a:r>
+              <a:rPr lang="en-US" altLang="zh-CN" dirty="0">
+                <a:latin typeface="Times New Roman" panose="02020603050405020304" pitchFamily="18" charset="0"/>
+                <a:cs typeface="Times New Roman" panose="02020603050405020304" pitchFamily="18" charset="0"/>
+              </a:rPr>
+              <a:t>Insertion: </a:t>
+            </a:r>
+            <a:r>
+              <a:rPr lang="zh-CN" altLang="en-US" b="1" i="1" dirty="0">
+                <a:latin typeface="Times New Roman" panose="02020603050405020304" pitchFamily="18" charset="0"/>
+                <a:cs typeface="Times New Roman" panose="02020603050405020304" pitchFamily="18" charset="0"/>
+              </a:rPr>
+              <a:t>𝑑 </a:t>
+            </a:r>
+            <a:r>
+              <a:rPr lang="en-US" altLang="zh-CN" b="1" i="1" dirty="0">
+                <a:latin typeface="Times New Roman" panose="02020603050405020304" pitchFamily="18" charset="0"/>
+                <a:cs typeface="Times New Roman" panose="02020603050405020304" pitchFamily="18" charset="0"/>
+              </a:rPr>
+              <a:t>[</a:t>
+            </a:r>
+            <a:r>
+              <a:rPr lang="en-US" altLang="zh-CN" b="1" i="1" dirty="0" err="1">
+                <a:latin typeface="Times New Roman" panose="02020603050405020304" pitchFamily="18" charset="0"/>
+                <a:cs typeface="Times New Roman" panose="02020603050405020304" pitchFamily="18" charset="0"/>
+              </a:rPr>
+              <a:t>i</a:t>
+            </a:r>
+            <a:r>
+              <a:rPr lang="en-US" altLang="zh-CN" b="1" i="1" dirty="0">
+                <a:latin typeface="Times New Roman" panose="02020603050405020304" pitchFamily="18" charset="0"/>
+                <a:cs typeface="Times New Roman" panose="02020603050405020304" pitchFamily="18" charset="0"/>
+              </a:rPr>
+              <a:t>][j−1]+1</a:t>
+            </a:r>
+          </a:p>
+          <a:p>
+            <a:pPr>
+              <a:lnSpc>
+                <a:spcPct val="120000"/>
+              </a:lnSpc>
+            </a:pPr>
+            <a:r>
+              <a:rPr lang="en-US" altLang="zh-CN" dirty="0">
+                <a:latin typeface="Times New Roman" panose="02020603050405020304" pitchFamily="18" charset="0"/>
+                <a:cs typeface="Times New Roman" panose="02020603050405020304" pitchFamily="18" charset="0"/>
+              </a:rPr>
+              <a:t>Replacement: </a:t>
+            </a:r>
+            <a:r>
+              <a:rPr lang="zh-CN" altLang="en-US" b="1" i="1" dirty="0">
+                <a:latin typeface="Times New Roman" panose="02020603050405020304" pitchFamily="18" charset="0"/>
+                <a:cs typeface="Times New Roman" panose="02020603050405020304" pitchFamily="18" charset="0"/>
+              </a:rPr>
+              <a:t>𝑑 </a:t>
+            </a:r>
+            <a:r>
+              <a:rPr lang="en-US" altLang="zh-CN" b="1" i="1" dirty="0">
+                <a:latin typeface="Times New Roman" panose="02020603050405020304" pitchFamily="18" charset="0"/>
+                <a:cs typeface="Times New Roman" panose="02020603050405020304" pitchFamily="18" charset="0"/>
+              </a:rPr>
+              <a:t>[i−1][j−1]+1</a:t>
+            </a:r>
+          </a:p>
+          <a:p>
+            <a:pPr>
+              <a:lnSpc>
+                <a:spcPct val="120000"/>
+              </a:lnSpc>
+            </a:pPr>
+            <a:r>
+              <a:rPr lang="en-US" altLang="zh-CN" dirty="0">
+                <a:latin typeface="Times New Roman" panose="02020603050405020304" pitchFamily="18" charset="0"/>
+                <a:cs typeface="Times New Roman" panose="02020603050405020304" pitchFamily="18" charset="0"/>
+              </a:rPr>
+              <a:t>The last element of the matrix, d[m][n], contains the minimum number of edit operations required to convert the entire first string into the second string.</a:t>
+            </a:r>
+          </a:p>
+          <a:p>
+            <a:pPr>
+              <a:lnSpc>
+                <a:spcPct val="120000"/>
+              </a:lnSpc>
+            </a:pPr>
+            <a:r>
+              <a:rPr lang="en-GB" altLang="zh-CN" dirty="0">
+                <a:latin typeface="Times New Roman" panose="02020603050405020304" pitchFamily="18" charset="0"/>
+                <a:cs typeface="Times New Roman" panose="02020603050405020304" pitchFamily="18" charset="0"/>
+              </a:rPr>
+              <a:t>Advantage</a:t>
+            </a:r>
+            <a:r>
+              <a:rPr lang="zh-CN" altLang="en-US" dirty="0">
+                <a:latin typeface="Times New Roman" panose="02020603050405020304" pitchFamily="18" charset="0"/>
+                <a:cs typeface="Times New Roman" panose="02020603050405020304" pitchFamily="18" charset="0"/>
+              </a:rPr>
+              <a:t>：</a:t>
+            </a:r>
+            <a:endParaRPr lang="en-US" altLang="zh-CN" dirty="0">
+              <a:latin typeface="Times New Roman" panose="02020603050405020304" pitchFamily="18" charset="0"/>
+              <a:cs typeface="Times New Roman" panose="02020603050405020304" pitchFamily="18" charset="0"/>
+            </a:endParaRPr>
+          </a:p>
+          <a:p>
+            <a:pPr>
+              <a:lnSpc>
+                <a:spcPct val="120000"/>
+              </a:lnSpc>
+            </a:pPr>
+            <a:r>
+              <a:rPr lang="en-US" altLang="zh-CN" dirty="0">
+                <a:latin typeface="Times New Roman" panose="02020603050405020304" pitchFamily="18" charset="0"/>
+                <a:cs typeface="Times New Roman" panose="02020603050405020304" pitchFamily="18" charset="0"/>
+              </a:rPr>
+              <a:t>1. Simplicity and intuitiveness: The calculation of </a:t>
+            </a:r>
+            <a:r>
+              <a:rPr lang="en-US" altLang="zh-CN" dirty="0" err="1">
+                <a:latin typeface="Times New Roman" panose="02020603050405020304" pitchFamily="18" charset="0"/>
+                <a:cs typeface="Times New Roman" panose="02020603050405020304" pitchFamily="18" charset="0"/>
+              </a:rPr>
+              <a:t>Levenshtein</a:t>
+            </a:r>
+            <a:r>
+              <a:rPr lang="en-US" altLang="zh-CN" dirty="0">
+                <a:latin typeface="Times New Roman" panose="02020603050405020304" pitchFamily="18" charset="0"/>
+                <a:cs typeface="Times New Roman" panose="02020603050405020304" pitchFamily="18" charset="0"/>
+              </a:rPr>
+              <a:t> distance is based on three basic string operations: insertion, deletion and replacement.</a:t>
+            </a:r>
+          </a:p>
+          <a:p>
+            <a:pPr>
+              <a:lnSpc>
+                <a:spcPct val="120000"/>
+              </a:lnSpc>
+            </a:pPr>
+            <a:r>
+              <a:rPr lang="en-US" altLang="zh-CN" dirty="0">
+                <a:latin typeface="Times New Roman" panose="02020603050405020304" pitchFamily="18" charset="0"/>
+                <a:cs typeface="Times New Roman" panose="02020603050405020304" pitchFamily="18" charset="0"/>
+              </a:rPr>
+              <a:t>2. Computational efficiency: Although calculating the entire matrix requires high time complexity, by using dynamic programming, the calculation of </a:t>
+            </a:r>
+            <a:r>
+              <a:rPr lang="en-US" altLang="zh-CN" dirty="0" err="1">
+                <a:latin typeface="Times New Roman" panose="02020603050405020304" pitchFamily="18" charset="0"/>
+                <a:cs typeface="Times New Roman" panose="02020603050405020304" pitchFamily="18" charset="0"/>
+              </a:rPr>
+              <a:t>Levenshtein</a:t>
+            </a:r>
+            <a:r>
+              <a:rPr lang="en-US" altLang="zh-CN" dirty="0">
+                <a:latin typeface="Times New Roman" panose="02020603050405020304" pitchFamily="18" charset="0"/>
+                <a:cs typeface="Times New Roman" panose="02020603050405020304" pitchFamily="18" charset="0"/>
+              </a:rPr>
+              <a:t> distance can achieve acceptable execution speed through appropriate optimization.</a:t>
+            </a:r>
+          </a:p>
+          <a:p>
+            <a:pPr>
+              <a:lnSpc>
+                <a:spcPct val="120000"/>
+              </a:lnSpc>
+            </a:pPr>
+            <a:r>
+              <a:rPr lang="en-US" altLang="zh-CN" dirty="0">
+                <a:latin typeface="Times New Roman" panose="02020603050405020304" pitchFamily="18" charset="0"/>
+                <a:cs typeface="Times New Roman" panose="02020603050405020304" pitchFamily="18" charset="0"/>
+              </a:rPr>
+              <a:t>3. Wide range of applicability: This method can not only be applied to text data, but can also be extended to any data type that can be serialized.</a:t>
+            </a:r>
+            <a:endParaRPr lang="zh-CN" altLang="en-US" dirty="0">
+              <a:latin typeface="Times New Roman" panose="02020603050405020304" pitchFamily="18" charset="0"/>
+              <a:cs typeface="Times New Roman" panose="02020603050405020304" pitchFamily="18" charset="0"/>
+            </a:endParaRPr>
           </a:p>
         </p:txBody>
       </p:sp>
     </p:spTree>
     <p:extLst>
       <p:ext uri="{BB962C8B-B14F-4D97-AF65-F5344CB8AC3E}">
-        <p14:creationId xmlns:p14="http://schemas.microsoft.com/office/powerpoint/2010/main" val="2616143390"/>
+        <p14:creationId xmlns:p14="http://schemas.microsoft.com/office/powerpoint/2010/main" val="3224059382"/>
       </p:ext>
     </p:extLst>
   </p:cSld>
@@ -6046,7 +6910,7 @@
           <p:cNvPr id="2" name="Title 1">
             <a:extLst>
               <a:ext uri="{FF2B5EF4-FFF2-40B4-BE49-F238E27FC236}">
-                <a16:creationId xmlns:a16="http://schemas.microsoft.com/office/drawing/2014/main" id="{A5EBCF6C-F3B7-D40C-4116-938723043DC0}"/>
+                <a16:creationId xmlns:a16="http://schemas.microsoft.com/office/drawing/2014/main" id="{8FF5C523-683A-0BB4-7A9C-CFE3D1DC2C5B}"/>
               </a:ext>
             </a:extLst>
           </p:cNvPr>
@@ -6066,7 +6930,7 @@
           <a:p>
             <a:r>
               <a:rPr lang="en-US" dirty="0"/>
-              <a:t>1 SLIDE ANALYSIS ON CLUSTERING RESULTS</a:t>
+              <a:t>ANALYSIS ON DIMENSIONALITY REDUCTION OUTCOMES USE ABOUT 1-2 SLIDES</a:t>
             </a:r>
           </a:p>
         </p:txBody>
@@ -6076,7 +6940,7 @@
           <p:cNvPr id="3" name="Content Placeholder 2">
             <a:extLst>
               <a:ext uri="{FF2B5EF4-FFF2-40B4-BE49-F238E27FC236}">
-                <a16:creationId xmlns:a16="http://schemas.microsoft.com/office/drawing/2014/main" id="{502B6705-E1B7-84F3-6D9A-BA8C0DB780B8}"/>
+                <a16:creationId xmlns:a16="http://schemas.microsoft.com/office/drawing/2014/main" id="{8912B0F5-80EF-6C0A-8582-2BDBEB8C57A6}"/>
               </a:ext>
             </a:extLst>
           </p:cNvPr>
@@ -6094,15 +6958,18 @@
           <a:p>
             <a:r>
               <a:rPr lang="en-US" dirty="0"/>
-              <a:t>CLUSTERING RESULTS (DBSCAN)TO BE ADDED HERE AND EXPLAINED BY JIADONG</a:t>
-            </a:r>
+              <a:t>TO BE ADDED BY JIADONG AND TO BE EXPLAINED BY HIM IN THE PRESENTATION</a:t>
+            </a:r>
+          </a:p>
+          <a:p>
+            <a:endParaRPr lang="en-US" dirty="0"/>
           </a:p>
         </p:txBody>
       </p:sp>
     </p:spTree>
     <p:extLst>
       <p:ext uri="{BB962C8B-B14F-4D97-AF65-F5344CB8AC3E}">
-        <p14:creationId xmlns:p14="http://schemas.microsoft.com/office/powerpoint/2010/main" val="3384461454"/>
+        <p14:creationId xmlns:p14="http://schemas.microsoft.com/office/powerpoint/2010/main" val="2616143390"/>
       </p:ext>
     </p:extLst>
   </p:cSld>
@@ -6182,7 +7049,7 @@
           <a:p>
             <a:r>
               <a:rPr lang="en-US" dirty="0"/>
-              <a:t>CLUSTERING RESULTS (AGGLOMERATIVE)TO BE ADDED HERE AND EXPLAINED BY FANGNAN</a:t>
+              <a:t>CLUSTERING RESULTS (DBSCAN)TO BE ADDED HERE AND EXPLAINED BY JIADONG</a:t>
             </a:r>
           </a:p>
         </p:txBody>
@@ -6190,7 +7057,7 @@
     </p:spTree>
     <p:extLst>
       <p:ext uri="{BB962C8B-B14F-4D97-AF65-F5344CB8AC3E}">
-        <p14:creationId xmlns:p14="http://schemas.microsoft.com/office/powerpoint/2010/main" val="722228977"/>
+        <p14:creationId xmlns:p14="http://schemas.microsoft.com/office/powerpoint/2010/main" val="3384461454"/>
       </p:ext>
     </p:extLst>
   </p:cSld>

</xml_diff>